<commit_message>
Changed the name of Usage and Constant classes.
The classes are now called ConsumerVariable and ProviderVariable.
</commit_message>
<xml_diff>
--- a/USDLPricingModel_v2_src.pptx
+++ b/USDLPricingModel_v2_src.pptx
@@ -288,7 +288,7 @@
           <a:p>
             <a:fld id="{4401D073-8692-CF44-86C4-80F2CCDBDDE1}" type="datetimeFigureOut">
               <a:rPr lang="en-US" smtClean="0"/>
-              <a:t>22/03/2014</a:t>
+              <a:t>19/07/2014</a:t>
             </a:fld>
             <a:endParaRPr lang="en-US"/>
           </a:p>
@@ -458,7 +458,7 @@
           <a:p>
             <a:fld id="{4401D073-8692-CF44-86C4-80F2CCDBDDE1}" type="datetimeFigureOut">
               <a:rPr lang="en-US" smtClean="0"/>
-              <a:t>22/03/2014</a:t>
+              <a:t>19/07/2014</a:t>
             </a:fld>
             <a:endParaRPr lang="en-US"/>
           </a:p>
@@ -638,7 +638,7 @@
           <a:p>
             <a:fld id="{4401D073-8692-CF44-86C4-80F2CCDBDDE1}" type="datetimeFigureOut">
               <a:rPr lang="en-US" smtClean="0"/>
-              <a:t>22/03/2014</a:t>
+              <a:t>19/07/2014</a:t>
             </a:fld>
             <a:endParaRPr lang="en-US"/>
           </a:p>
@@ -808,7 +808,7 @@
           <a:p>
             <a:fld id="{4401D073-8692-CF44-86C4-80F2CCDBDDE1}" type="datetimeFigureOut">
               <a:rPr lang="en-US" smtClean="0"/>
-              <a:t>22/03/2014</a:t>
+              <a:t>19/07/2014</a:t>
             </a:fld>
             <a:endParaRPr lang="en-US"/>
           </a:p>
@@ -1054,7 +1054,7 @@
           <a:p>
             <a:fld id="{4401D073-8692-CF44-86C4-80F2CCDBDDE1}" type="datetimeFigureOut">
               <a:rPr lang="en-US" smtClean="0"/>
-              <a:t>22/03/2014</a:t>
+              <a:t>19/07/2014</a:t>
             </a:fld>
             <a:endParaRPr lang="en-US"/>
           </a:p>
@@ -1342,7 +1342,7 @@
           <a:p>
             <a:fld id="{4401D073-8692-CF44-86C4-80F2CCDBDDE1}" type="datetimeFigureOut">
               <a:rPr lang="en-US" smtClean="0"/>
-              <a:t>22/03/2014</a:t>
+              <a:t>19/07/2014</a:t>
             </a:fld>
             <a:endParaRPr lang="en-US"/>
           </a:p>
@@ -1764,7 +1764,7 @@
           <a:p>
             <a:fld id="{4401D073-8692-CF44-86C4-80F2CCDBDDE1}" type="datetimeFigureOut">
               <a:rPr lang="en-US" smtClean="0"/>
-              <a:t>22/03/2014</a:t>
+              <a:t>19/07/2014</a:t>
             </a:fld>
             <a:endParaRPr lang="en-US"/>
           </a:p>
@@ -1882,7 +1882,7 @@
           <a:p>
             <a:fld id="{4401D073-8692-CF44-86C4-80F2CCDBDDE1}" type="datetimeFigureOut">
               <a:rPr lang="en-US" smtClean="0"/>
-              <a:t>22/03/2014</a:t>
+              <a:t>19/07/2014</a:t>
             </a:fld>
             <a:endParaRPr lang="en-US"/>
           </a:p>
@@ -1977,7 +1977,7 @@
           <a:p>
             <a:fld id="{4401D073-8692-CF44-86C4-80F2CCDBDDE1}" type="datetimeFigureOut">
               <a:rPr lang="en-US" smtClean="0"/>
-              <a:t>22/03/2014</a:t>
+              <a:t>19/07/2014</a:t>
             </a:fld>
             <a:endParaRPr lang="en-US"/>
           </a:p>
@@ -2254,7 +2254,7 @@
           <a:p>
             <a:fld id="{4401D073-8692-CF44-86C4-80F2CCDBDDE1}" type="datetimeFigureOut">
               <a:rPr lang="en-US" smtClean="0"/>
-              <a:t>22/03/2014</a:t>
+              <a:t>19/07/2014</a:t>
             </a:fld>
             <a:endParaRPr lang="en-US"/>
           </a:p>
@@ -2507,7 +2507,7 @@
           <a:p>
             <a:fld id="{4401D073-8692-CF44-86C4-80F2CCDBDDE1}" type="datetimeFigureOut">
               <a:rPr lang="en-US" smtClean="0"/>
-              <a:t>22/03/2014</a:t>
+              <a:t>19/07/2014</a:t>
             </a:fld>
             <a:endParaRPr lang="en-US"/>
           </a:p>
@@ -2720,7 +2720,7 @@
           <a:p>
             <a:fld id="{4401D073-8692-CF44-86C4-80F2CCDBDDE1}" type="datetimeFigureOut">
               <a:rPr lang="en-US" smtClean="0"/>
-              <a:t>22/03/2014</a:t>
+              <a:t>19/07/2014</a:t>
             </a:fld>
             <a:endParaRPr lang="en-US"/>
           </a:p>
@@ -3210,10 +3210,6 @@
             <a:lstStyle/>
             <a:p>
               <a:pPr algn="ctr"/>
-              <a:r>
-                <a:rPr lang="en-US" dirty="0" smtClean="0"/>
-                <a:t/>
-              </a:r>
               <a:endParaRPr lang="en-US" dirty="0"/>
             </a:p>
           </p:txBody>
@@ -3334,10 +3330,6 @@
             <a:lstStyle/>
             <a:p>
               <a:pPr algn="ctr"/>
-              <a:r>
-                <a:rPr lang="en-US" dirty="0" smtClean="0"/>
-                <a:t/>
-              </a:r>
               <a:endParaRPr lang="en-US" dirty="0"/>
             </a:p>
           </p:txBody>
@@ -3458,10 +3450,6 @@
             <a:lstStyle/>
             <a:p>
               <a:pPr algn="ctr"/>
-              <a:r>
-                <a:rPr lang="en-US" dirty="0" smtClean="0"/>
-                <a:t/>
-              </a:r>
               <a:endParaRPr lang="en-US" dirty="0"/>
             </a:p>
           </p:txBody>
@@ -3529,7 +3517,16 @@
                   </a:solidFill>
                   <a:latin typeface="Abadi MT Condensed Light"/>
                 </a:rPr>
-                <a:t>usdl-price:Constant</a:t>
+                <a:t>usdl-</a:t>
+              </a:r>
+              <a:r>
+                <a:rPr lang="en-US" sz="1400" dirty="0" err="1" smtClean="0">
+                  <a:solidFill>
+                    <a:schemeClr val="tx1"/>
+                  </a:solidFill>
+                  <a:latin typeface="Abadi MT Condensed Light"/>
+                </a:rPr>
+                <a:t>price:ProviderVariable</a:t>
               </a:r>
               <a:endParaRPr lang="en-US" sz="1400" dirty="0">
                 <a:solidFill>
@@ -3582,10 +3579,6 @@
             <a:lstStyle/>
             <a:p>
               <a:pPr algn="ctr"/>
-              <a:r>
-                <a:rPr lang="en-US" dirty="0" smtClean="0"/>
-                <a:t/>
-              </a:r>
               <a:endParaRPr lang="en-US" dirty="0"/>
             </a:p>
           </p:txBody>
@@ -3653,7 +3646,16 @@
                   </a:solidFill>
                   <a:latin typeface="Abadi MT Condensed Light"/>
                 </a:rPr>
-                <a:t>usdl-price:Usage</a:t>
+                <a:t>usdl-</a:t>
+              </a:r>
+              <a:r>
+                <a:rPr lang="en-US" sz="1400" dirty="0" err="1" smtClean="0">
+                  <a:solidFill>
+                    <a:schemeClr val="tx1"/>
+                  </a:solidFill>
+                  <a:latin typeface="Abadi MT Condensed Light"/>
+                </a:rPr>
+                <a:t>price:ConsumerVariable</a:t>
               </a:r>
               <a:endParaRPr lang="en-US" sz="1400" dirty="0">
                 <a:solidFill>
@@ -3706,10 +3708,6 @@
             <a:lstStyle/>
             <a:p>
               <a:pPr algn="ctr"/>
-              <a:r>
-                <a:rPr lang="en-US" dirty="0" smtClean="0"/>
-                <a:t/>
-              </a:r>
               <a:endParaRPr lang="en-US" dirty="0"/>
             </a:p>
           </p:txBody>
@@ -3830,10 +3828,6 @@
             <a:lstStyle/>
             <a:p>
               <a:pPr algn="ctr"/>
-              <a:r>
-                <a:rPr lang="en-US" dirty="0" smtClean="0"/>
-                <a:t/>
-              </a:r>
               <a:endParaRPr lang="en-US" dirty="0"/>
             </a:p>
           </p:txBody>
@@ -3954,10 +3948,6 @@
             <a:lstStyle/>
             <a:p>
               <a:pPr algn="ctr"/>
-              <a:r>
-                <a:rPr lang="en-US" dirty="0" smtClean="0"/>
-                <a:t/>
-              </a:r>
               <a:endParaRPr lang="en-US" dirty="0"/>
             </a:p>
           </p:txBody>
@@ -4078,10 +4068,6 @@
             <a:lstStyle/>
             <a:p>
               <a:pPr algn="ctr"/>
-              <a:r>
-                <a:rPr lang="en-US" dirty="0" smtClean="0"/>
-                <a:t/>
-              </a:r>
               <a:endParaRPr lang="en-US" dirty="0"/>
             </a:p>
           </p:txBody>
@@ -4202,10 +4188,6 @@
             <a:lstStyle/>
             <a:p>
               <a:pPr algn="ctr"/>
-              <a:r>
-                <a:rPr lang="en-US" dirty="0" smtClean="0"/>
-                <a:t/>
-              </a:r>
               <a:endParaRPr lang="en-US" dirty="0"/>
             </a:p>
           </p:txBody>
@@ -4326,10 +4308,6 @@
             <a:lstStyle/>
             <a:p>
               <a:pPr algn="ctr"/>
-              <a:r>
-                <a:rPr lang="en-US" dirty="0" smtClean="0"/>
-                <a:t/>
-              </a:r>
               <a:endParaRPr lang="en-US" dirty="0"/>
             </a:p>
           </p:txBody>
@@ -4450,10 +4428,6 @@
             <a:lstStyle/>
             <a:p>
               <a:pPr algn="ctr"/>
-              <a:r>
-                <a:rPr lang="en-US" dirty="0" smtClean="0"/>
-                <a:t/>
-              </a:r>
               <a:endParaRPr lang="en-US" dirty="0"/>
             </a:p>
           </p:txBody>
@@ -5238,11 +5212,7 @@
             </a:r>
             <a:r>
               <a:rPr lang="en-US" sz="1100" dirty="0" err="1" smtClean="0"/>
-              <a:t>sdl-</a:t>
-            </a:r>
-            <a:r>
-              <a:rPr lang="en-US" sz="1100" dirty="0" err="1" smtClean="0"/>
-              <a:t>price:hasComponentFloor</a:t>
+              <a:t>sdl-price:hasComponentFloor</a:t>
             </a:r>
             <a:endParaRPr lang="en-US" sz="1100" dirty="0"/>
           </a:p>

</xml_diff>